<commit_message>
Finalized Phase Three Presentation
</commit_message>
<xml_diff>
--- a/docs/phase_three_docs/Phase_Three_Presentation.pptx
+++ b/docs/phase_three_docs/Phase_Three_Presentation.pptx
@@ -13066,7 +13066,20 @@
                 </a:ln>
                 <a:effectLst/>
               </a:rPr>
-              <a:t> table to </a:t>
+              <a:t> table </a:t>
+            </a:r>
+            <a:r>
+              <a:rPr lang="en-US" altLang="en-US" sz="1900" dirty="0"/>
+              <a:t>cut</a:t>
+            </a:r>
+            <a:r>
+              <a:rPr kumimoji="0" lang="en-US" altLang="en-US" sz="1900" i="0" u="none" strike="noStrike" cap="none" normalizeH="0" baseline="0" dirty="0">
+                <a:ln>
+                  <a:noFill/>
+                </a:ln>
+                <a:effectLst/>
+              </a:rPr>
+              <a:t> </a:t>
             </a:r>
             <a:endParaRPr lang="en-US" altLang="en-US" sz="1900" dirty="0"/>
           </a:p>

</xml_diff>